<commit_message>
rebuild from collection with design.pptx
</commit_message>
<xml_diff>
--- a/csv2anki/design.pptx
+++ b/csv2anki/design.pptx
@@ -6,6 +6,7 @@
   </p:sldMasterIdLst>
   <p:sldIdLst>
     <p:sldId id="256" r:id="rId2"/>
+    <p:sldId id="257" r:id="rId3"/>
   </p:sldIdLst>
   <p:sldSz cx="12192000" cy="6858000"/>
   <p:notesSz cx="6858000" cy="9144000"/>
@@ -252,7 +253,7 @@
           <a:p>
             <a:fld id="{A96FB359-0509-4226-834D-6F1306F6973B}" type="datetimeFigureOut">
               <a:rPr lang="zh-CN" altLang="en-US" smtClean="0"/>
-              <a:t>2017/3/17</a:t>
+              <a:t>2017/3/20</a:t>
             </a:fld>
             <a:endParaRPr lang="zh-CN" altLang="en-US"/>
           </a:p>
@@ -420,7 +421,7 @@
           <a:p>
             <a:fld id="{A96FB359-0509-4226-834D-6F1306F6973B}" type="datetimeFigureOut">
               <a:rPr lang="zh-CN" altLang="en-US" smtClean="0"/>
-              <a:t>2017/3/17</a:t>
+              <a:t>2017/3/20</a:t>
             </a:fld>
             <a:endParaRPr lang="zh-CN" altLang="en-US"/>
           </a:p>
@@ -598,7 +599,7 @@
           <a:p>
             <a:fld id="{A96FB359-0509-4226-834D-6F1306F6973B}" type="datetimeFigureOut">
               <a:rPr lang="zh-CN" altLang="en-US" smtClean="0"/>
-              <a:t>2017/3/17</a:t>
+              <a:t>2017/3/20</a:t>
             </a:fld>
             <a:endParaRPr lang="zh-CN" altLang="en-US"/>
           </a:p>
@@ -766,7 +767,7 @@
           <a:p>
             <a:fld id="{A96FB359-0509-4226-834D-6F1306F6973B}" type="datetimeFigureOut">
               <a:rPr lang="zh-CN" altLang="en-US" smtClean="0"/>
-              <a:t>2017/3/17</a:t>
+              <a:t>2017/3/20</a:t>
             </a:fld>
             <a:endParaRPr lang="zh-CN" altLang="en-US"/>
           </a:p>
@@ -1011,7 +1012,7 @@
           <a:p>
             <a:fld id="{A96FB359-0509-4226-834D-6F1306F6973B}" type="datetimeFigureOut">
               <a:rPr lang="zh-CN" altLang="en-US" smtClean="0"/>
-              <a:t>2017/3/17</a:t>
+              <a:t>2017/3/20</a:t>
             </a:fld>
             <a:endParaRPr lang="zh-CN" altLang="en-US"/>
           </a:p>
@@ -1240,7 +1241,7 @@
           <a:p>
             <a:fld id="{A96FB359-0509-4226-834D-6F1306F6973B}" type="datetimeFigureOut">
               <a:rPr lang="zh-CN" altLang="en-US" smtClean="0"/>
-              <a:t>2017/3/17</a:t>
+              <a:t>2017/3/20</a:t>
             </a:fld>
             <a:endParaRPr lang="zh-CN" altLang="en-US"/>
           </a:p>
@@ -1604,7 +1605,7 @@
           <a:p>
             <a:fld id="{A96FB359-0509-4226-834D-6F1306F6973B}" type="datetimeFigureOut">
               <a:rPr lang="zh-CN" altLang="en-US" smtClean="0"/>
-              <a:t>2017/3/17</a:t>
+              <a:t>2017/3/20</a:t>
             </a:fld>
             <a:endParaRPr lang="zh-CN" altLang="en-US"/>
           </a:p>
@@ -1721,7 +1722,7 @@
           <a:p>
             <a:fld id="{A96FB359-0509-4226-834D-6F1306F6973B}" type="datetimeFigureOut">
               <a:rPr lang="zh-CN" altLang="en-US" smtClean="0"/>
-              <a:t>2017/3/17</a:t>
+              <a:t>2017/3/20</a:t>
             </a:fld>
             <a:endParaRPr lang="zh-CN" altLang="en-US"/>
           </a:p>
@@ -1816,7 +1817,7 @@
           <a:p>
             <a:fld id="{A96FB359-0509-4226-834D-6F1306F6973B}" type="datetimeFigureOut">
               <a:rPr lang="zh-CN" altLang="en-US" smtClean="0"/>
-              <a:t>2017/3/17</a:t>
+              <a:t>2017/3/20</a:t>
             </a:fld>
             <a:endParaRPr lang="zh-CN" altLang="en-US"/>
           </a:p>
@@ -2091,7 +2092,7 @@
           <a:p>
             <a:fld id="{A96FB359-0509-4226-834D-6F1306F6973B}" type="datetimeFigureOut">
               <a:rPr lang="zh-CN" altLang="en-US" smtClean="0"/>
-              <a:t>2017/3/17</a:t>
+              <a:t>2017/3/20</a:t>
             </a:fld>
             <a:endParaRPr lang="zh-CN" altLang="en-US"/>
           </a:p>
@@ -2343,7 +2344,7 @@
           <a:p>
             <a:fld id="{A96FB359-0509-4226-834D-6F1306F6973B}" type="datetimeFigureOut">
               <a:rPr lang="zh-CN" altLang="en-US" smtClean="0"/>
-              <a:t>2017/3/17</a:t>
+              <a:t>2017/3/20</a:t>
             </a:fld>
             <a:endParaRPr lang="zh-CN" altLang="en-US"/>
           </a:p>
@@ -2554,7 +2555,7 @@
           <a:p>
             <a:fld id="{A96FB359-0509-4226-834D-6F1306F6973B}" type="datetimeFigureOut">
               <a:rPr lang="zh-CN" altLang="en-US" smtClean="0"/>
-              <a:t>2017/3/17</a:t>
+              <a:t>2017/3/20</a:t>
             </a:fld>
             <a:endParaRPr lang="zh-CN" altLang="en-US"/>
           </a:p>
@@ -4194,6 +4195,2391 @@
 </p:sld>
 </file>
 
+<file path=ppt/slides/slide2.xml><?xml version="1.0" encoding="utf-8"?>
+<p:sld xmlns:a="http://schemas.openxmlformats.org/drawingml/2006/main" xmlns:r="http://schemas.openxmlformats.org/officeDocument/2006/relationships" xmlns:p="http://schemas.openxmlformats.org/presentationml/2006/main">
+  <p:cSld>
+    <p:spTree>
+      <p:nvGrpSpPr>
+        <p:cNvPr id="1" name=""/>
+        <p:cNvGrpSpPr/>
+        <p:nvPr/>
+      </p:nvGrpSpPr>
+      <p:grpSpPr>
+        <a:xfrm>
+          <a:off x="0" y="0"/>
+          <a:ext cx="0" cy="0"/>
+          <a:chOff x="0" y="0"/>
+          <a:chExt cx="0" cy="0"/>
+        </a:xfrm>
+      </p:grpSpPr>
+      <p:sp>
+        <p:nvSpPr>
+          <p:cNvPr id="8" name="矩形 7"/>
+          <p:cNvSpPr/>
+          <p:nvPr/>
+        </p:nvSpPr>
+        <p:spPr>
+          <a:xfrm>
+            <a:off x="4757056" y="385538"/>
+            <a:ext cx="2677887" cy="6099627"/>
+          </a:xfrm>
+          <a:prstGeom prst="rect">
+            <a:avLst/>
+          </a:prstGeom>
+        </p:spPr>
+        <p:style>
+          <a:lnRef idx="2">
+            <a:schemeClr val="accent4">
+              <a:shade val="50000"/>
+            </a:schemeClr>
+          </a:lnRef>
+          <a:fillRef idx="1">
+            <a:schemeClr val="accent4"/>
+          </a:fillRef>
+          <a:effectRef idx="0">
+            <a:schemeClr val="accent4"/>
+          </a:effectRef>
+          <a:fontRef idx="minor">
+            <a:schemeClr val="lt1"/>
+          </a:fontRef>
+        </p:style>
+        <p:txBody>
+          <a:bodyPr rtlCol="0" anchor="t"/>
+          <a:lstStyle/>
+          <a:p>
+            <a:r>
+              <a:rPr lang="en-US" altLang="zh-CN" dirty="0" smtClean="0"/>
+              <a:t>Col</a:t>
+            </a:r>
+            <a:endParaRPr lang="en-US" altLang="zh-CN" dirty="0"/>
+          </a:p>
+        </p:txBody>
+      </p:sp>
+      <p:sp>
+        <p:nvSpPr>
+          <p:cNvPr id="4" name="矩形 3"/>
+          <p:cNvSpPr/>
+          <p:nvPr/>
+        </p:nvSpPr>
+        <p:spPr>
+          <a:xfrm>
+            <a:off x="5072743" y="3117392"/>
+            <a:ext cx="2046514" cy="2113197"/>
+          </a:xfrm>
+          <a:prstGeom prst="rect">
+            <a:avLst/>
+          </a:prstGeom>
+        </p:spPr>
+        <p:style>
+          <a:lnRef idx="2">
+            <a:schemeClr val="accent4">
+              <a:shade val="50000"/>
+            </a:schemeClr>
+          </a:lnRef>
+          <a:fillRef idx="1">
+            <a:schemeClr val="accent4"/>
+          </a:fillRef>
+          <a:effectRef idx="0">
+            <a:schemeClr val="accent4"/>
+          </a:effectRef>
+          <a:fontRef idx="minor">
+            <a:schemeClr val="lt1"/>
+          </a:fontRef>
+        </p:style>
+        <p:txBody>
+          <a:bodyPr rtlCol="0" anchor="t"/>
+          <a:lstStyle/>
+          <a:p>
+            <a:r>
+              <a:rPr lang="en-US" altLang="zh-CN" dirty="0" err="1" smtClean="0"/>
+              <a:t>Model_decks</a:t>
+            </a:r>
+            <a:endParaRPr lang="en-US" altLang="zh-CN" dirty="0"/>
+          </a:p>
+        </p:txBody>
+      </p:sp>
+      <p:sp>
+        <p:nvSpPr>
+          <p:cNvPr id="5" name="圆角矩形 4"/>
+          <p:cNvSpPr/>
+          <p:nvPr/>
+        </p:nvSpPr>
+        <p:spPr>
+          <a:xfrm>
+            <a:off x="5470071" y="4298032"/>
+            <a:ext cx="1251857" cy="363771"/>
+          </a:xfrm>
+          <a:prstGeom prst="roundRect">
+            <a:avLst/>
+          </a:prstGeom>
+        </p:spPr>
+        <p:style>
+          <a:lnRef idx="2">
+            <a:schemeClr val="accent2">
+              <a:shade val="50000"/>
+            </a:schemeClr>
+          </a:lnRef>
+          <a:fillRef idx="1">
+            <a:schemeClr val="accent2"/>
+          </a:fillRef>
+          <a:effectRef idx="0">
+            <a:schemeClr val="accent2"/>
+          </a:effectRef>
+          <a:fontRef idx="minor">
+            <a:schemeClr val="lt1"/>
+          </a:fontRef>
+        </p:style>
+        <p:txBody>
+          <a:bodyPr rtlCol="0" anchor="t"/>
+          <a:lstStyle/>
+          <a:p>
+            <a:r>
+              <a:rPr lang="en-US" altLang="zh-CN" dirty="0" smtClean="0"/>
+              <a:t>Model</a:t>
+            </a:r>
+          </a:p>
+        </p:txBody>
+      </p:sp>
+      <p:sp>
+        <p:nvSpPr>
+          <p:cNvPr id="6" name="圆角矩形 5"/>
+          <p:cNvSpPr/>
+          <p:nvPr/>
+        </p:nvSpPr>
+        <p:spPr>
+          <a:xfrm>
+            <a:off x="5470072" y="4727123"/>
+            <a:ext cx="1251857" cy="363771"/>
+          </a:xfrm>
+          <a:prstGeom prst="roundRect">
+            <a:avLst/>
+          </a:prstGeom>
+        </p:spPr>
+        <p:style>
+          <a:lnRef idx="2">
+            <a:schemeClr val="accent2">
+              <a:shade val="50000"/>
+            </a:schemeClr>
+          </a:lnRef>
+          <a:fillRef idx="1">
+            <a:schemeClr val="accent2"/>
+          </a:fillRef>
+          <a:effectRef idx="0">
+            <a:schemeClr val="accent2"/>
+          </a:effectRef>
+          <a:fontRef idx="minor">
+            <a:schemeClr val="lt1"/>
+          </a:fontRef>
+        </p:style>
+        <p:txBody>
+          <a:bodyPr rtlCol="0" anchor="t"/>
+          <a:lstStyle/>
+          <a:p>
+            <a:r>
+              <a:rPr lang="en-US" altLang="zh-CN" dirty="0" smtClean="0"/>
+              <a:t>Deck</a:t>
+            </a:r>
+          </a:p>
+        </p:txBody>
+      </p:sp>
+      <p:sp>
+        <p:nvSpPr>
+          <p:cNvPr id="7" name="圆角矩形 6"/>
+          <p:cNvSpPr/>
+          <p:nvPr/>
+        </p:nvSpPr>
+        <p:spPr>
+          <a:xfrm>
+            <a:off x="5467348" y="3504735"/>
+            <a:ext cx="1251857" cy="729343"/>
+          </a:xfrm>
+          <a:prstGeom prst="roundRect">
+            <a:avLst/>
+          </a:prstGeom>
+        </p:spPr>
+        <p:style>
+          <a:lnRef idx="2">
+            <a:schemeClr val="accent4">
+              <a:shade val="50000"/>
+            </a:schemeClr>
+          </a:lnRef>
+          <a:fillRef idx="1">
+            <a:schemeClr val="accent4"/>
+          </a:fillRef>
+          <a:effectRef idx="0">
+            <a:schemeClr val="accent4"/>
+          </a:effectRef>
+          <a:fontRef idx="minor">
+            <a:schemeClr val="lt1"/>
+          </a:fontRef>
+        </p:style>
+        <p:txBody>
+          <a:bodyPr rtlCol="0" anchor="t"/>
+          <a:lstStyle/>
+          <a:p>
+            <a:r>
+              <a:rPr lang="en-US" altLang="zh-CN" dirty="0" smtClean="0"/>
+              <a:t>Notes</a:t>
+            </a:r>
+          </a:p>
+          <a:p>
+            <a:r>
+              <a:rPr lang="en-US" altLang="zh-CN" dirty="0" smtClean="0"/>
+              <a:t>..tags</a:t>
+            </a:r>
+          </a:p>
+        </p:txBody>
+      </p:sp>
+      <p:sp>
+        <p:nvSpPr>
+          <p:cNvPr id="9" name="矩形 8"/>
+          <p:cNvSpPr/>
+          <p:nvPr/>
+        </p:nvSpPr>
+        <p:spPr>
+          <a:xfrm>
+            <a:off x="5067299" y="5459187"/>
+            <a:ext cx="881743" cy="293914"/>
+          </a:xfrm>
+          <a:prstGeom prst="rect">
+            <a:avLst/>
+          </a:prstGeom>
+        </p:spPr>
+        <p:style>
+          <a:lnRef idx="2">
+            <a:schemeClr val="accent1">
+              <a:shade val="50000"/>
+            </a:schemeClr>
+          </a:lnRef>
+          <a:fillRef idx="1">
+            <a:schemeClr val="accent1"/>
+          </a:fillRef>
+          <a:effectRef idx="0">
+            <a:schemeClr val="accent1"/>
+          </a:effectRef>
+          <a:fontRef idx="minor">
+            <a:schemeClr val="lt1"/>
+          </a:fontRef>
+        </p:style>
+        <p:txBody>
+          <a:bodyPr rtlCol="0" anchor="ctr"/>
+          <a:lstStyle/>
+          <a:p>
+            <a:pPr algn="ctr"/>
+            <a:r>
+              <a:rPr lang="en-US" altLang="zh-CN" dirty="0" err="1" smtClean="0"/>
+              <a:t>Conf</a:t>
+            </a:r>
+            <a:endParaRPr lang="en-US" altLang="zh-CN" dirty="0" smtClean="0"/>
+          </a:p>
+        </p:txBody>
+      </p:sp>
+      <p:sp>
+        <p:nvSpPr>
+          <p:cNvPr id="10" name="矩形 9"/>
+          <p:cNvSpPr/>
+          <p:nvPr/>
+        </p:nvSpPr>
+        <p:spPr>
+          <a:xfrm>
+            <a:off x="6237513" y="5459187"/>
+            <a:ext cx="881743" cy="293914"/>
+          </a:xfrm>
+          <a:prstGeom prst="rect">
+            <a:avLst/>
+          </a:prstGeom>
+        </p:spPr>
+        <p:style>
+          <a:lnRef idx="2">
+            <a:schemeClr val="accent1">
+              <a:shade val="50000"/>
+            </a:schemeClr>
+          </a:lnRef>
+          <a:fillRef idx="1">
+            <a:schemeClr val="accent1"/>
+          </a:fillRef>
+          <a:effectRef idx="0">
+            <a:schemeClr val="accent1"/>
+          </a:effectRef>
+          <a:fontRef idx="minor">
+            <a:schemeClr val="lt1"/>
+          </a:fontRef>
+        </p:style>
+        <p:txBody>
+          <a:bodyPr rtlCol="0" anchor="ctr"/>
+          <a:lstStyle/>
+          <a:p>
+            <a:pPr algn="ctr"/>
+            <a:r>
+              <a:rPr lang="en-US" altLang="zh-CN" dirty="0" err="1" smtClean="0"/>
+              <a:t>Dconf</a:t>
+            </a:r>
+            <a:endParaRPr lang="en-US" altLang="zh-CN" dirty="0" smtClean="0"/>
+          </a:p>
+        </p:txBody>
+      </p:sp>
+      <p:sp>
+        <p:nvSpPr>
+          <p:cNvPr id="11" name="矩形 10"/>
+          <p:cNvSpPr/>
+          <p:nvPr/>
+        </p:nvSpPr>
+        <p:spPr>
+          <a:xfrm>
+            <a:off x="5072743" y="5881009"/>
+            <a:ext cx="2046514" cy="375558"/>
+          </a:xfrm>
+          <a:prstGeom prst="rect">
+            <a:avLst/>
+          </a:prstGeom>
+        </p:spPr>
+        <p:style>
+          <a:lnRef idx="2">
+            <a:schemeClr val="accent1">
+              <a:shade val="50000"/>
+            </a:schemeClr>
+          </a:lnRef>
+          <a:fillRef idx="1">
+            <a:schemeClr val="accent1"/>
+          </a:fillRef>
+          <a:effectRef idx="0">
+            <a:schemeClr val="accent1"/>
+          </a:effectRef>
+          <a:fontRef idx="minor">
+            <a:schemeClr val="lt1"/>
+          </a:fontRef>
+        </p:style>
+        <p:txBody>
+          <a:bodyPr rtlCol="0" anchor="ctr"/>
+          <a:lstStyle/>
+          <a:p>
+            <a:pPr algn="ctr"/>
+            <a:r>
+              <a:rPr lang="en-US" altLang="zh-CN" dirty="0" smtClean="0"/>
+              <a:t>media</a:t>
+            </a:r>
+          </a:p>
+        </p:txBody>
+      </p:sp>
+      <p:sp>
+        <p:nvSpPr>
+          <p:cNvPr id="13" name="矩形 12"/>
+          <p:cNvSpPr/>
+          <p:nvPr/>
+        </p:nvSpPr>
+        <p:spPr>
+          <a:xfrm>
+            <a:off x="5067299" y="767448"/>
+            <a:ext cx="2051957" cy="1636461"/>
+          </a:xfrm>
+          <a:prstGeom prst="rect">
+            <a:avLst/>
+          </a:prstGeom>
+        </p:spPr>
+        <p:style>
+          <a:lnRef idx="2">
+            <a:schemeClr val="accent4">
+              <a:shade val="50000"/>
+            </a:schemeClr>
+          </a:lnRef>
+          <a:fillRef idx="1">
+            <a:schemeClr val="accent4"/>
+          </a:fillRef>
+          <a:effectRef idx="0">
+            <a:schemeClr val="accent4"/>
+          </a:effectRef>
+          <a:fontRef idx="minor">
+            <a:schemeClr val="lt1"/>
+          </a:fontRef>
+        </p:style>
+        <p:txBody>
+          <a:bodyPr rtlCol="0" anchor="ctr"/>
+          <a:lstStyle/>
+          <a:p>
+            <a:r>
+              <a:rPr lang="en-US" altLang="zh-CN" dirty="0" smtClean="0"/>
+              <a:t>Models</a:t>
+            </a:r>
+            <a:endParaRPr lang="en-US" altLang="zh-CN" dirty="0"/>
+          </a:p>
+          <a:p>
+            <a:r>
+              <a:rPr lang="en-US" altLang="zh-CN" dirty="0"/>
+              <a:t>.</a:t>
+            </a:r>
+            <a:r>
+              <a:rPr lang="en-US" altLang="zh-CN" dirty="0" err="1"/>
+              <a:t>tmpls</a:t>
+            </a:r>
+            <a:endParaRPr lang="en-US" altLang="zh-CN" dirty="0"/>
+          </a:p>
+          <a:p>
+            <a:r>
+              <a:rPr lang="en-US" altLang="zh-CN" dirty="0"/>
+              <a:t>.</a:t>
+            </a:r>
+            <a:r>
+              <a:rPr lang="en-US" altLang="zh-CN" dirty="0" err="1"/>
+              <a:t>flds</a:t>
+            </a:r>
+            <a:endParaRPr lang="en-US" altLang="zh-CN" dirty="0"/>
+          </a:p>
+          <a:p>
+            <a:r>
+              <a:rPr lang="en-US" altLang="zh-CN" dirty="0"/>
+              <a:t>. </a:t>
+            </a:r>
+            <a:r>
+              <a:rPr lang="en-US" altLang="zh-CN" dirty="0" err="1"/>
+              <a:t>is_cloze</a:t>
+            </a:r>
+            <a:endParaRPr lang="en-US" altLang="zh-CN" dirty="0"/>
+          </a:p>
+          <a:p>
+            <a:r>
+              <a:rPr lang="en-US" altLang="zh-CN" dirty="0"/>
+              <a:t>..</a:t>
+            </a:r>
+            <a:r>
+              <a:rPr lang="en-US" altLang="zh-CN" dirty="0" err="1" smtClean="0"/>
+              <a:t>css</a:t>
+            </a:r>
+            <a:endParaRPr lang="en-US" altLang="zh-CN" dirty="0" smtClean="0"/>
+          </a:p>
+          <a:p>
+            <a:r>
+              <a:rPr lang="en-US" altLang="zh-CN" dirty="0" smtClean="0"/>
+              <a:t>..</a:t>
+            </a:r>
+            <a:r>
+              <a:rPr lang="en-US" altLang="zh-CN" dirty="0" err="1" smtClean="0"/>
+              <a:t>model_name</a:t>
+            </a:r>
+            <a:endParaRPr lang="en-US" altLang="zh-CN" dirty="0"/>
+          </a:p>
+        </p:txBody>
+      </p:sp>
+      <p:sp>
+        <p:nvSpPr>
+          <p:cNvPr id="15" name="矩形 14"/>
+          <p:cNvSpPr/>
+          <p:nvPr/>
+        </p:nvSpPr>
+        <p:spPr>
+          <a:xfrm>
+            <a:off x="5067300" y="2543604"/>
+            <a:ext cx="2051956" cy="468086"/>
+          </a:xfrm>
+          <a:prstGeom prst="rect">
+            <a:avLst/>
+          </a:prstGeom>
+        </p:spPr>
+        <p:style>
+          <a:lnRef idx="2">
+            <a:schemeClr val="accent4">
+              <a:shade val="50000"/>
+            </a:schemeClr>
+          </a:lnRef>
+          <a:fillRef idx="1">
+            <a:schemeClr val="accent4"/>
+          </a:fillRef>
+          <a:effectRef idx="0">
+            <a:schemeClr val="accent4"/>
+          </a:effectRef>
+          <a:fontRef idx="minor">
+            <a:schemeClr val="lt1"/>
+          </a:fontRef>
+        </p:style>
+        <p:txBody>
+          <a:bodyPr rtlCol="0" anchor="ctr"/>
+          <a:lstStyle/>
+          <a:p>
+            <a:r>
+              <a:rPr lang="en-US" altLang="zh-CN" dirty="0" smtClean="0"/>
+              <a:t>Decks  .</a:t>
+            </a:r>
+            <a:r>
+              <a:rPr lang="en-US" altLang="zh-CN" dirty="0" err="1" smtClean="0"/>
+              <a:t>deck_name</a:t>
+            </a:r>
+            <a:endParaRPr lang="zh-CN" altLang="en-US" dirty="0"/>
+          </a:p>
+        </p:txBody>
+      </p:sp>
+      <p:sp>
+        <p:nvSpPr>
+          <p:cNvPr id="16" name="矩形 15"/>
+          <p:cNvSpPr/>
+          <p:nvPr/>
+        </p:nvSpPr>
+        <p:spPr>
+          <a:xfrm>
+            <a:off x="1106713" y="385539"/>
+            <a:ext cx="2677887" cy="6112331"/>
+          </a:xfrm>
+          <a:prstGeom prst="rect">
+            <a:avLst/>
+          </a:prstGeom>
+          <a:solidFill>
+            <a:schemeClr val="accent2">
+              <a:lumMod val="40000"/>
+              <a:lumOff val="60000"/>
+            </a:schemeClr>
+          </a:solidFill>
+          <a:ln>
+            <a:noFill/>
+          </a:ln>
+        </p:spPr>
+        <p:style>
+          <a:lnRef idx="2">
+            <a:schemeClr val="accent4">
+              <a:shade val="50000"/>
+            </a:schemeClr>
+          </a:lnRef>
+          <a:fillRef idx="1">
+            <a:schemeClr val="accent4"/>
+          </a:fillRef>
+          <a:effectRef idx="0">
+            <a:schemeClr val="accent4"/>
+          </a:effectRef>
+          <a:fontRef idx="minor">
+            <a:schemeClr val="lt1"/>
+          </a:fontRef>
+        </p:style>
+        <p:txBody>
+          <a:bodyPr rtlCol="0" anchor="t"/>
+          <a:lstStyle/>
+          <a:p>
+            <a:pPr algn="ctr"/>
+            <a:r>
+              <a:rPr lang="en-US" altLang="zh-CN" dirty="0" smtClean="0">
+                <a:solidFill>
+                  <a:schemeClr val="tx1"/>
+                </a:solidFill>
+              </a:rPr>
+              <a:t>File System</a:t>
+            </a:r>
+          </a:p>
+        </p:txBody>
+      </p:sp>
+      <p:sp>
+        <p:nvSpPr>
+          <p:cNvPr id="17" name="矩形 16"/>
+          <p:cNvSpPr/>
+          <p:nvPr/>
+        </p:nvSpPr>
+        <p:spPr>
+          <a:xfrm>
+            <a:off x="9327350" y="385539"/>
+            <a:ext cx="2677887" cy="6112331"/>
+          </a:xfrm>
+          <a:prstGeom prst="rect">
+            <a:avLst/>
+          </a:prstGeom>
+          <a:solidFill>
+            <a:schemeClr val="accent2">
+              <a:lumMod val="40000"/>
+              <a:lumOff val="60000"/>
+            </a:schemeClr>
+          </a:solidFill>
+          <a:ln>
+            <a:noFill/>
+          </a:ln>
+        </p:spPr>
+        <p:style>
+          <a:lnRef idx="2">
+            <a:schemeClr val="accent4">
+              <a:shade val="50000"/>
+            </a:schemeClr>
+          </a:lnRef>
+          <a:fillRef idx="1">
+            <a:schemeClr val="accent4"/>
+          </a:fillRef>
+          <a:effectRef idx="0">
+            <a:schemeClr val="accent4"/>
+          </a:effectRef>
+          <a:fontRef idx="minor">
+            <a:schemeClr val="lt1"/>
+          </a:fontRef>
+        </p:style>
+        <p:txBody>
+          <a:bodyPr rtlCol="0" anchor="t"/>
+          <a:lstStyle/>
+          <a:p>
+            <a:pPr algn="ctr"/>
+            <a:r>
+              <a:rPr lang="en-US" altLang="zh-CN" dirty="0" smtClean="0">
+                <a:solidFill>
+                  <a:schemeClr val="tx1"/>
+                </a:solidFill>
+              </a:rPr>
+              <a:t>DB</a:t>
+            </a:r>
+            <a:endParaRPr lang="en-US" altLang="zh-CN" dirty="0">
+              <a:solidFill>
+                <a:schemeClr val="tx1"/>
+              </a:solidFill>
+            </a:endParaRPr>
+          </a:p>
+        </p:txBody>
+      </p:sp>
+      <p:sp>
+        <p:nvSpPr>
+          <p:cNvPr id="18" name="矩形 17"/>
+          <p:cNvSpPr/>
+          <p:nvPr/>
+        </p:nvSpPr>
+        <p:spPr>
+          <a:xfrm>
+            <a:off x="1476827" y="898075"/>
+            <a:ext cx="2006601" cy="1467258"/>
+          </a:xfrm>
+          <a:prstGeom prst="rect">
+            <a:avLst/>
+          </a:prstGeom>
+        </p:spPr>
+        <p:style>
+          <a:lnRef idx="2">
+            <a:schemeClr val="accent4">
+              <a:shade val="50000"/>
+            </a:schemeClr>
+          </a:lnRef>
+          <a:fillRef idx="1">
+            <a:schemeClr val="accent4"/>
+          </a:fillRef>
+          <a:effectRef idx="0">
+            <a:schemeClr val="accent4"/>
+          </a:effectRef>
+          <a:fontRef idx="minor">
+            <a:schemeClr val="lt1"/>
+          </a:fontRef>
+        </p:style>
+        <p:txBody>
+          <a:bodyPr rtlCol="0" anchor="t"/>
+          <a:lstStyle/>
+          <a:p>
+            <a:r>
+              <a:rPr lang="en-US" altLang="zh-CN" dirty="0" smtClean="0"/>
+              <a:t>CSV</a:t>
+            </a:r>
+          </a:p>
+          <a:p>
+            <a:r>
+              <a:rPr lang="en-US" altLang="zh-CN" dirty="0" smtClean="0"/>
+              <a:t>.</a:t>
+            </a:r>
+            <a:r>
+              <a:rPr lang="en-US" altLang="zh-CN" dirty="0" err="1" smtClean="0"/>
+              <a:t>file_name</a:t>
+            </a:r>
+            <a:endParaRPr lang="en-US" altLang="zh-CN" dirty="0" smtClean="0"/>
+          </a:p>
+          <a:p>
+            <a:r>
+              <a:rPr lang="en-US" altLang="zh-CN" dirty="0" smtClean="0"/>
+              <a:t>.</a:t>
+            </a:r>
+            <a:r>
+              <a:rPr lang="en-US" altLang="zh-CN" dirty="0" err="1" smtClean="0"/>
+              <a:t>flds</a:t>
+            </a:r>
+            <a:endParaRPr lang="en-US" altLang="zh-CN" dirty="0" smtClean="0"/>
+          </a:p>
+          <a:p>
+            <a:r>
+              <a:rPr lang="en-US" altLang="zh-CN" dirty="0" smtClean="0"/>
+              <a:t>.</a:t>
+            </a:r>
+            <a:r>
+              <a:rPr lang="en-US" altLang="zh-CN" dirty="0" err="1" smtClean="0"/>
+              <a:t>notes</a:t>
+            </a:r>
+            <a:r>
+              <a:rPr lang="en-US" altLang="zh-CN" dirty="0" err="1"/>
+              <a:t>..</a:t>
+            </a:r>
+            <a:r>
+              <a:rPr lang="en-US" altLang="zh-CN" dirty="0" err="1" smtClean="0"/>
+              <a:t>tags</a:t>
+            </a:r>
+            <a:endParaRPr lang="zh-CN" altLang="en-US" dirty="0"/>
+          </a:p>
+        </p:txBody>
+      </p:sp>
+      <p:sp>
+        <p:nvSpPr>
+          <p:cNvPr id="37" name="矩形 36"/>
+          <p:cNvSpPr/>
+          <p:nvPr/>
+        </p:nvSpPr>
+        <p:spPr>
+          <a:xfrm>
+            <a:off x="1476827" y="2518644"/>
+            <a:ext cx="2006601" cy="483953"/>
+          </a:xfrm>
+          <a:prstGeom prst="rect">
+            <a:avLst/>
+          </a:prstGeom>
+        </p:spPr>
+        <p:style>
+          <a:lnRef idx="2">
+            <a:schemeClr val="accent4">
+              <a:shade val="50000"/>
+            </a:schemeClr>
+          </a:lnRef>
+          <a:fillRef idx="1">
+            <a:schemeClr val="accent4"/>
+          </a:fillRef>
+          <a:effectRef idx="0">
+            <a:schemeClr val="accent4"/>
+          </a:effectRef>
+          <a:fontRef idx="minor">
+            <a:schemeClr val="lt1"/>
+          </a:fontRef>
+        </p:style>
+        <p:txBody>
+          <a:bodyPr rtlCol="0" anchor="t"/>
+          <a:lstStyle/>
+          <a:p>
+            <a:r>
+              <a:rPr lang="en-US" altLang="zh-CN" dirty="0" err="1" smtClean="0"/>
+              <a:t>Tmpls</a:t>
+            </a:r>
+            <a:endParaRPr lang="en-US" altLang="zh-CN" dirty="0" smtClean="0"/>
+          </a:p>
+        </p:txBody>
+      </p:sp>
+      <p:sp>
+        <p:nvSpPr>
+          <p:cNvPr id="54" name="右箭头 53"/>
+          <p:cNvSpPr/>
+          <p:nvPr/>
+        </p:nvSpPr>
+        <p:spPr>
+          <a:xfrm>
+            <a:off x="2692853" y="1315374"/>
+            <a:ext cx="1371145" cy="170514"/>
+          </a:xfrm>
+          <a:prstGeom prst="rightArrow">
+            <a:avLst/>
+          </a:prstGeom>
+        </p:spPr>
+        <p:style>
+          <a:lnRef idx="2">
+            <a:schemeClr val="accent1">
+              <a:shade val="50000"/>
+            </a:schemeClr>
+          </a:lnRef>
+          <a:fillRef idx="1">
+            <a:schemeClr val="accent1"/>
+          </a:fillRef>
+          <a:effectRef idx="0">
+            <a:schemeClr val="accent1"/>
+          </a:effectRef>
+          <a:fontRef idx="minor">
+            <a:schemeClr val="lt1"/>
+          </a:fontRef>
+        </p:style>
+        <p:txBody>
+          <a:bodyPr rtlCol="0" anchor="ctr"/>
+          <a:lstStyle/>
+          <a:p>
+            <a:pPr algn="ctr"/>
+            <a:endParaRPr lang="zh-CN" altLang="en-US"/>
+          </a:p>
+        </p:txBody>
+      </p:sp>
+      <p:sp>
+        <p:nvSpPr>
+          <p:cNvPr id="55" name="右箭头 54"/>
+          <p:cNvSpPr/>
+          <p:nvPr/>
+        </p:nvSpPr>
+        <p:spPr>
+          <a:xfrm rot="2368607">
+            <a:off x="3889603" y="1798398"/>
+            <a:ext cx="1371145" cy="170514"/>
+          </a:xfrm>
+          <a:prstGeom prst="rightArrow">
+            <a:avLst/>
+          </a:prstGeom>
+        </p:spPr>
+        <p:style>
+          <a:lnRef idx="2">
+            <a:schemeClr val="accent1">
+              <a:shade val="50000"/>
+            </a:schemeClr>
+          </a:lnRef>
+          <a:fillRef idx="1">
+            <a:schemeClr val="accent1"/>
+          </a:fillRef>
+          <a:effectRef idx="0">
+            <a:schemeClr val="accent1"/>
+          </a:effectRef>
+          <a:fontRef idx="minor">
+            <a:schemeClr val="lt1"/>
+          </a:fontRef>
+        </p:style>
+        <p:txBody>
+          <a:bodyPr rtlCol="0" anchor="ctr"/>
+          <a:lstStyle/>
+          <a:p>
+            <a:pPr algn="ctr"/>
+            <a:endParaRPr lang="zh-CN" altLang="en-US"/>
+          </a:p>
+        </p:txBody>
+      </p:sp>
+      <p:sp>
+        <p:nvSpPr>
+          <p:cNvPr id="56" name="右箭头 55"/>
+          <p:cNvSpPr/>
+          <p:nvPr/>
+        </p:nvSpPr>
+        <p:spPr>
+          <a:xfrm rot="2943866">
+            <a:off x="3712210" y="1970020"/>
+            <a:ext cx="1749195" cy="187392"/>
+          </a:xfrm>
+          <a:prstGeom prst="rightArrow">
+            <a:avLst/>
+          </a:prstGeom>
+        </p:spPr>
+        <p:style>
+          <a:lnRef idx="2">
+            <a:schemeClr val="accent1">
+              <a:shade val="50000"/>
+            </a:schemeClr>
+          </a:lnRef>
+          <a:fillRef idx="1">
+            <a:schemeClr val="accent1"/>
+          </a:fillRef>
+          <a:effectRef idx="0">
+            <a:schemeClr val="accent1"/>
+          </a:effectRef>
+          <a:fontRef idx="minor">
+            <a:schemeClr val="lt1"/>
+          </a:fontRef>
+        </p:style>
+        <p:txBody>
+          <a:bodyPr rtlCol="0" anchor="ctr"/>
+          <a:lstStyle/>
+          <a:p>
+            <a:pPr algn="ctr"/>
+            <a:r>
+              <a:rPr lang="en-US" altLang="zh-CN" dirty="0" smtClean="0"/>
+              <a:t>`</a:t>
+            </a:r>
+            <a:endParaRPr lang="zh-CN" altLang="en-US" dirty="0"/>
+          </a:p>
+        </p:txBody>
+      </p:sp>
+      <p:sp>
+        <p:nvSpPr>
+          <p:cNvPr id="57" name="右箭头 56"/>
+          <p:cNvSpPr/>
+          <p:nvPr/>
+        </p:nvSpPr>
+        <p:spPr>
+          <a:xfrm>
+            <a:off x="2545217" y="1585678"/>
+            <a:ext cx="1371145" cy="170514"/>
+          </a:xfrm>
+          <a:prstGeom prst="rightArrow">
+            <a:avLst/>
+          </a:prstGeom>
+        </p:spPr>
+        <p:style>
+          <a:lnRef idx="2">
+            <a:schemeClr val="accent1">
+              <a:shade val="50000"/>
+            </a:schemeClr>
+          </a:lnRef>
+          <a:fillRef idx="1">
+            <a:schemeClr val="accent1"/>
+          </a:fillRef>
+          <a:effectRef idx="0">
+            <a:schemeClr val="accent1"/>
+          </a:effectRef>
+          <a:fontRef idx="minor">
+            <a:schemeClr val="lt1"/>
+          </a:fontRef>
+        </p:style>
+        <p:txBody>
+          <a:bodyPr rtlCol="0" anchor="ctr"/>
+          <a:lstStyle/>
+          <a:p>
+            <a:pPr algn="ctr"/>
+            <a:endParaRPr lang="zh-CN" altLang="en-US"/>
+          </a:p>
+        </p:txBody>
+      </p:sp>
+      <p:sp>
+        <p:nvSpPr>
+          <p:cNvPr id="58" name="右箭头 57"/>
+          <p:cNvSpPr/>
+          <p:nvPr/>
+        </p:nvSpPr>
+        <p:spPr>
+          <a:xfrm rot="20983624">
+            <a:off x="3770310" y="1489973"/>
+            <a:ext cx="1371145" cy="170514"/>
+          </a:xfrm>
+          <a:prstGeom prst="rightArrow">
+            <a:avLst/>
+          </a:prstGeom>
+        </p:spPr>
+        <p:style>
+          <a:lnRef idx="2">
+            <a:schemeClr val="accent1">
+              <a:shade val="50000"/>
+            </a:schemeClr>
+          </a:lnRef>
+          <a:fillRef idx="1">
+            <a:schemeClr val="accent1"/>
+          </a:fillRef>
+          <a:effectRef idx="0">
+            <a:schemeClr val="accent1"/>
+          </a:effectRef>
+          <a:fontRef idx="minor">
+            <a:schemeClr val="lt1"/>
+          </a:fontRef>
+        </p:style>
+        <p:txBody>
+          <a:bodyPr rtlCol="0" anchor="ctr"/>
+          <a:lstStyle/>
+          <a:p>
+            <a:pPr algn="ctr"/>
+            <a:endParaRPr lang="zh-CN" altLang="en-US"/>
+          </a:p>
+        </p:txBody>
+      </p:sp>
+      <p:sp>
+        <p:nvSpPr>
+          <p:cNvPr id="59" name="右箭头 58"/>
+          <p:cNvSpPr/>
+          <p:nvPr/>
+        </p:nvSpPr>
+        <p:spPr>
+          <a:xfrm>
+            <a:off x="2672193" y="2681296"/>
+            <a:ext cx="1371145" cy="170514"/>
+          </a:xfrm>
+          <a:prstGeom prst="rightArrow">
+            <a:avLst/>
+          </a:prstGeom>
+        </p:spPr>
+        <p:style>
+          <a:lnRef idx="2">
+            <a:schemeClr val="accent1">
+              <a:shade val="50000"/>
+            </a:schemeClr>
+          </a:lnRef>
+          <a:fillRef idx="1">
+            <a:schemeClr val="accent1"/>
+          </a:fillRef>
+          <a:effectRef idx="0">
+            <a:schemeClr val="accent1"/>
+          </a:effectRef>
+          <a:fontRef idx="minor">
+            <a:schemeClr val="lt1"/>
+          </a:fontRef>
+        </p:style>
+        <p:txBody>
+          <a:bodyPr rtlCol="0" anchor="ctr"/>
+          <a:lstStyle/>
+          <a:p>
+            <a:pPr algn="ctr"/>
+            <a:endParaRPr lang="zh-CN" altLang="en-US"/>
+          </a:p>
+        </p:txBody>
+      </p:sp>
+      <p:sp>
+        <p:nvSpPr>
+          <p:cNvPr id="60" name="右箭头 59"/>
+          <p:cNvSpPr/>
+          <p:nvPr/>
+        </p:nvSpPr>
+        <p:spPr>
+          <a:xfrm rot="18200887">
+            <a:off x="3586619" y="1856592"/>
+            <a:ext cx="1903261" cy="201372"/>
+          </a:xfrm>
+          <a:prstGeom prst="rightArrow">
+            <a:avLst/>
+          </a:prstGeom>
+        </p:spPr>
+        <p:style>
+          <a:lnRef idx="2">
+            <a:schemeClr val="accent1">
+              <a:shade val="50000"/>
+            </a:schemeClr>
+          </a:lnRef>
+          <a:fillRef idx="1">
+            <a:schemeClr val="accent1"/>
+          </a:fillRef>
+          <a:effectRef idx="0">
+            <a:schemeClr val="accent1"/>
+          </a:effectRef>
+          <a:fontRef idx="minor">
+            <a:schemeClr val="lt1"/>
+          </a:fontRef>
+        </p:style>
+        <p:txBody>
+          <a:bodyPr rtlCol="0" anchor="ctr"/>
+          <a:lstStyle/>
+          <a:p>
+            <a:pPr algn="ctr"/>
+            <a:r>
+              <a:rPr lang="en-US" altLang="zh-CN" dirty="0" smtClean="0"/>
+              <a:t>`</a:t>
+            </a:r>
+            <a:endParaRPr lang="zh-CN" altLang="en-US" dirty="0"/>
+          </a:p>
+        </p:txBody>
+      </p:sp>
+      <p:sp>
+        <p:nvSpPr>
+          <p:cNvPr id="63" name="矩形 62"/>
+          <p:cNvSpPr/>
+          <p:nvPr/>
+        </p:nvSpPr>
+        <p:spPr>
+          <a:xfrm>
+            <a:off x="1476827" y="3127458"/>
+            <a:ext cx="2006601" cy="483953"/>
+          </a:xfrm>
+          <a:prstGeom prst="rect">
+            <a:avLst/>
+          </a:prstGeom>
+        </p:spPr>
+        <p:style>
+          <a:lnRef idx="2">
+            <a:schemeClr val="accent1">
+              <a:shade val="50000"/>
+            </a:schemeClr>
+          </a:lnRef>
+          <a:fillRef idx="1">
+            <a:schemeClr val="accent1"/>
+          </a:fillRef>
+          <a:effectRef idx="0">
+            <a:schemeClr val="accent1"/>
+          </a:effectRef>
+          <a:fontRef idx="minor">
+            <a:schemeClr val="lt1"/>
+          </a:fontRef>
+        </p:style>
+        <p:txBody>
+          <a:bodyPr rtlCol="0" anchor="t"/>
+          <a:lstStyle/>
+          <a:p>
+            <a:r>
+              <a:rPr lang="en-US" altLang="zh-CN" dirty="0" smtClean="0"/>
+              <a:t>CSS</a:t>
+            </a:r>
+          </a:p>
+        </p:txBody>
+      </p:sp>
+      <p:sp>
+        <p:nvSpPr>
+          <p:cNvPr id="64" name="右箭头 63"/>
+          <p:cNvSpPr/>
+          <p:nvPr/>
+        </p:nvSpPr>
+        <p:spPr>
+          <a:xfrm>
+            <a:off x="2464930" y="3194442"/>
+            <a:ext cx="1371145" cy="170514"/>
+          </a:xfrm>
+          <a:prstGeom prst="rightArrow">
+            <a:avLst/>
+          </a:prstGeom>
+        </p:spPr>
+        <p:style>
+          <a:lnRef idx="2">
+            <a:schemeClr val="accent1">
+              <a:shade val="50000"/>
+            </a:schemeClr>
+          </a:lnRef>
+          <a:fillRef idx="1">
+            <a:schemeClr val="accent1"/>
+          </a:fillRef>
+          <a:effectRef idx="0">
+            <a:schemeClr val="accent1"/>
+          </a:effectRef>
+          <a:fontRef idx="minor">
+            <a:schemeClr val="lt1"/>
+          </a:fontRef>
+        </p:style>
+        <p:txBody>
+          <a:bodyPr rtlCol="0" anchor="ctr"/>
+          <a:lstStyle/>
+          <a:p>
+            <a:pPr algn="ctr"/>
+            <a:endParaRPr lang="zh-CN" altLang="en-US"/>
+          </a:p>
+        </p:txBody>
+      </p:sp>
+      <p:sp>
+        <p:nvSpPr>
+          <p:cNvPr id="65" name="右箭头 64"/>
+          <p:cNvSpPr/>
+          <p:nvPr/>
+        </p:nvSpPr>
+        <p:spPr>
+          <a:xfrm rot="18925131">
+            <a:off x="3461138" y="2534863"/>
+            <a:ext cx="1903261" cy="201372"/>
+          </a:xfrm>
+          <a:prstGeom prst="rightArrow">
+            <a:avLst/>
+          </a:prstGeom>
+        </p:spPr>
+        <p:style>
+          <a:lnRef idx="2">
+            <a:schemeClr val="accent1">
+              <a:shade val="50000"/>
+            </a:schemeClr>
+          </a:lnRef>
+          <a:fillRef idx="1">
+            <a:schemeClr val="accent1"/>
+          </a:fillRef>
+          <a:effectRef idx="0">
+            <a:schemeClr val="accent1"/>
+          </a:effectRef>
+          <a:fontRef idx="minor">
+            <a:schemeClr val="lt1"/>
+          </a:fontRef>
+        </p:style>
+        <p:txBody>
+          <a:bodyPr rtlCol="0" anchor="ctr"/>
+          <a:lstStyle/>
+          <a:p>
+            <a:pPr algn="ctr"/>
+            <a:r>
+              <a:rPr lang="en-US" altLang="zh-CN" dirty="0" smtClean="0"/>
+              <a:t>`</a:t>
+            </a:r>
+            <a:endParaRPr lang="zh-CN" altLang="en-US" dirty="0"/>
+          </a:p>
+        </p:txBody>
+      </p:sp>
+      <p:sp>
+        <p:nvSpPr>
+          <p:cNvPr id="66" name="右弧形箭头 65"/>
+          <p:cNvSpPr/>
+          <p:nvPr/>
+        </p:nvSpPr>
+        <p:spPr>
+          <a:xfrm flipH="1">
+            <a:off x="4636110" y="1161935"/>
+            <a:ext cx="368006" cy="630130"/>
+          </a:xfrm>
+          <a:prstGeom prst="curvedLeftArrow">
+            <a:avLst/>
+          </a:prstGeom>
+        </p:spPr>
+        <p:style>
+          <a:lnRef idx="2">
+            <a:schemeClr val="accent1">
+              <a:shade val="50000"/>
+            </a:schemeClr>
+          </a:lnRef>
+          <a:fillRef idx="1">
+            <a:schemeClr val="accent1"/>
+          </a:fillRef>
+          <a:effectRef idx="0">
+            <a:schemeClr val="accent1"/>
+          </a:effectRef>
+          <a:fontRef idx="minor">
+            <a:schemeClr val="lt1"/>
+          </a:fontRef>
+        </p:style>
+        <p:txBody>
+          <a:bodyPr rtlCol="0" anchor="ctr"/>
+          <a:lstStyle/>
+          <a:p>
+            <a:pPr algn="ctr"/>
+            <a:endParaRPr lang="zh-CN" altLang="en-US">
+              <a:solidFill>
+                <a:schemeClr val="tx1"/>
+              </a:solidFill>
+            </a:endParaRPr>
+          </a:p>
+        </p:txBody>
+      </p:sp>
+      <p:sp>
+        <p:nvSpPr>
+          <p:cNvPr id="67" name="左弧形箭头 66"/>
+          <p:cNvSpPr/>
+          <p:nvPr/>
+        </p:nvSpPr>
+        <p:spPr>
+          <a:xfrm>
+            <a:off x="4176486" y="855276"/>
+            <a:ext cx="791593" cy="3727875"/>
+          </a:xfrm>
+          <a:prstGeom prst="curvedRightArrow">
+            <a:avLst/>
+          </a:prstGeom>
+        </p:spPr>
+        <p:style>
+          <a:lnRef idx="2">
+            <a:schemeClr val="accent2">
+              <a:shade val="50000"/>
+            </a:schemeClr>
+          </a:lnRef>
+          <a:fillRef idx="1">
+            <a:schemeClr val="accent2"/>
+          </a:fillRef>
+          <a:effectRef idx="0">
+            <a:schemeClr val="accent2"/>
+          </a:effectRef>
+          <a:fontRef idx="minor">
+            <a:schemeClr val="lt1"/>
+          </a:fontRef>
+        </p:style>
+        <p:txBody>
+          <a:bodyPr rtlCol="0" anchor="ctr"/>
+          <a:lstStyle/>
+          <a:p>
+            <a:pPr algn="ctr"/>
+            <a:endParaRPr lang="zh-CN" altLang="en-US">
+              <a:solidFill>
+                <a:schemeClr val="tx1"/>
+              </a:solidFill>
+            </a:endParaRPr>
+          </a:p>
+        </p:txBody>
+      </p:sp>
+      <p:sp>
+        <p:nvSpPr>
+          <p:cNvPr id="68" name="左弧形箭头 67"/>
+          <p:cNvSpPr/>
+          <p:nvPr/>
+        </p:nvSpPr>
+        <p:spPr>
+          <a:xfrm>
+            <a:off x="4213786" y="2720074"/>
+            <a:ext cx="773814" cy="2342687"/>
+          </a:xfrm>
+          <a:prstGeom prst="curvedRightArrow">
+            <a:avLst/>
+          </a:prstGeom>
+        </p:spPr>
+        <p:style>
+          <a:lnRef idx="2">
+            <a:schemeClr val="accent2">
+              <a:shade val="50000"/>
+            </a:schemeClr>
+          </a:lnRef>
+          <a:fillRef idx="1">
+            <a:schemeClr val="accent2"/>
+          </a:fillRef>
+          <a:effectRef idx="0">
+            <a:schemeClr val="accent2"/>
+          </a:effectRef>
+          <a:fontRef idx="minor">
+            <a:schemeClr val="lt1"/>
+          </a:fontRef>
+        </p:style>
+        <p:txBody>
+          <a:bodyPr rtlCol="0" anchor="ctr"/>
+          <a:lstStyle/>
+          <a:p>
+            <a:pPr algn="ctr"/>
+            <a:endParaRPr lang="zh-CN" altLang="en-US">
+              <a:solidFill>
+                <a:schemeClr val="tx1"/>
+              </a:solidFill>
+            </a:endParaRPr>
+          </a:p>
+        </p:txBody>
+      </p:sp>
+      <p:sp>
+        <p:nvSpPr>
+          <p:cNvPr id="69" name="右箭头 68"/>
+          <p:cNvSpPr/>
+          <p:nvPr/>
+        </p:nvSpPr>
+        <p:spPr>
+          <a:xfrm rot="2024700">
+            <a:off x="2451687" y="2835032"/>
+            <a:ext cx="3106556" cy="148311"/>
+          </a:xfrm>
+          <a:prstGeom prst="rightArrow">
+            <a:avLst/>
+          </a:prstGeom>
+        </p:spPr>
+        <p:style>
+          <a:lnRef idx="2">
+            <a:schemeClr val="accent3">
+              <a:shade val="50000"/>
+            </a:schemeClr>
+          </a:lnRef>
+          <a:fillRef idx="1">
+            <a:schemeClr val="accent3"/>
+          </a:fillRef>
+          <a:effectRef idx="0">
+            <a:schemeClr val="accent3"/>
+          </a:effectRef>
+          <a:fontRef idx="minor">
+            <a:schemeClr val="lt1"/>
+          </a:fontRef>
+        </p:style>
+        <p:txBody>
+          <a:bodyPr rtlCol="0" anchor="ctr"/>
+          <a:lstStyle/>
+          <a:p>
+            <a:pPr algn="ctr"/>
+            <a:endParaRPr lang="zh-CN" altLang="en-US"/>
+          </a:p>
+        </p:txBody>
+      </p:sp>
+      <p:sp>
+        <p:nvSpPr>
+          <p:cNvPr id="70" name="矩形 69"/>
+          <p:cNvSpPr/>
+          <p:nvPr/>
+        </p:nvSpPr>
+        <p:spPr>
+          <a:xfrm>
+            <a:off x="1476827" y="5881009"/>
+            <a:ext cx="2046514" cy="375558"/>
+          </a:xfrm>
+          <a:prstGeom prst="rect">
+            <a:avLst/>
+          </a:prstGeom>
+        </p:spPr>
+        <p:style>
+          <a:lnRef idx="2">
+            <a:schemeClr val="accent1">
+              <a:shade val="50000"/>
+            </a:schemeClr>
+          </a:lnRef>
+          <a:fillRef idx="1">
+            <a:schemeClr val="accent1"/>
+          </a:fillRef>
+          <a:effectRef idx="0">
+            <a:schemeClr val="accent1"/>
+          </a:effectRef>
+          <a:fontRef idx="minor">
+            <a:schemeClr val="lt1"/>
+          </a:fontRef>
+        </p:style>
+        <p:txBody>
+          <a:bodyPr rtlCol="0" anchor="ctr"/>
+          <a:lstStyle/>
+          <a:p>
+            <a:pPr algn="ctr"/>
+            <a:r>
+              <a:rPr lang="en-US" altLang="zh-CN" dirty="0" smtClean="0"/>
+              <a:t>media</a:t>
+            </a:r>
+          </a:p>
+        </p:txBody>
+      </p:sp>
+      <p:sp>
+        <p:nvSpPr>
+          <p:cNvPr id="71" name="右箭头 70"/>
+          <p:cNvSpPr/>
+          <p:nvPr/>
+        </p:nvSpPr>
+        <p:spPr>
+          <a:xfrm>
+            <a:off x="3611796" y="5983531"/>
+            <a:ext cx="1371145" cy="170514"/>
+          </a:xfrm>
+          <a:prstGeom prst="rightArrow">
+            <a:avLst/>
+          </a:prstGeom>
+        </p:spPr>
+        <p:style>
+          <a:lnRef idx="2">
+            <a:schemeClr val="accent5">
+              <a:shade val="50000"/>
+            </a:schemeClr>
+          </a:lnRef>
+          <a:fillRef idx="1">
+            <a:schemeClr val="accent5"/>
+          </a:fillRef>
+          <a:effectRef idx="0">
+            <a:schemeClr val="accent5"/>
+          </a:effectRef>
+          <a:fontRef idx="minor">
+            <a:schemeClr val="lt1"/>
+          </a:fontRef>
+        </p:style>
+        <p:txBody>
+          <a:bodyPr rtlCol="0" anchor="ctr"/>
+          <a:lstStyle/>
+          <a:p>
+            <a:pPr algn="ctr"/>
+            <a:endParaRPr lang="zh-CN" altLang="en-US"/>
+          </a:p>
+        </p:txBody>
+      </p:sp>
+      <p:sp>
+        <p:nvSpPr>
+          <p:cNvPr id="72" name="右箭头 71"/>
+          <p:cNvSpPr/>
+          <p:nvPr/>
+        </p:nvSpPr>
+        <p:spPr>
+          <a:xfrm>
+            <a:off x="71105" y="1144860"/>
+            <a:ext cx="714352" cy="170514"/>
+          </a:xfrm>
+          <a:prstGeom prst="rightArrow">
+            <a:avLst/>
+          </a:prstGeom>
+        </p:spPr>
+        <p:style>
+          <a:lnRef idx="2">
+            <a:schemeClr val="accent1">
+              <a:shade val="50000"/>
+            </a:schemeClr>
+          </a:lnRef>
+          <a:fillRef idx="1">
+            <a:schemeClr val="accent1"/>
+          </a:fillRef>
+          <a:effectRef idx="0">
+            <a:schemeClr val="accent1"/>
+          </a:effectRef>
+          <a:fontRef idx="minor">
+            <a:schemeClr val="lt1"/>
+          </a:fontRef>
+        </p:style>
+        <p:txBody>
+          <a:bodyPr rtlCol="0" anchor="ctr"/>
+          <a:lstStyle/>
+          <a:p>
+            <a:pPr algn="ctr"/>
+            <a:endParaRPr lang="zh-CN" altLang="en-US"/>
+          </a:p>
+        </p:txBody>
+      </p:sp>
+      <p:sp>
+        <p:nvSpPr>
+          <p:cNvPr id="73" name="右箭头 72"/>
+          <p:cNvSpPr/>
+          <p:nvPr/>
+        </p:nvSpPr>
+        <p:spPr>
+          <a:xfrm>
+            <a:off x="71105" y="1315374"/>
+            <a:ext cx="714352" cy="170514"/>
+          </a:xfrm>
+          <a:prstGeom prst="rightArrow">
+            <a:avLst/>
+          </a:prstGeom>
+        </p:spPr>
+        <p:style>
+          <a:lnRef idx="2">
+            <a:schemeClr val="accent2">
+              <a:shade val="50000"/>
+            </a:schemeClr>
+          </a:lnRef>
+          <a:fillRef idx="1">
+            <a:schemeClr val="accent2"/>
+          </a:fillRef>
+          <a:effectRef idx="0">
+            <a:schemeClr val="accent2"/>
+          </a:effectRef>
+          <a:fontRef idx="minor">
+            <a:schemeClr val="lt1"/>
+          </a:fontRef>
+        </p:style>
+        <p:txBody>
+          <a:bodyPr rtlCol="0" anchor="ctr"/>
+          <a:lstStyle/>
+          <a:p>
+            <a:pPr algn="ctr"/>
+            <a:endParaRPr lang="zh-CN" altLang="en-US"/>
+          </a:p>
+        </p:txBody>
+      </p:sp>
+      <p:sp>
+        <p:nvSpPr>
+          <p:cNvPr id="74" name="右箭头 73"/>
+          <p:cNvSpPr/>
+          <p:nvPr/>
+        </p:nvSpPr>
+        <p:spPr>
+          <a:xfrm>
+            <a:off x="71105" y="1477000"/>
+            <a:ext cx="714352" cy="170514"/>
+          </a:xfrm>
+          <a:prstGeom prst="rightArrow">
+            <a:avLst/>
+          </a:prstGeom>
+        </p:spPr>
+        <p:style>
+          <a:lnRef idx="2">
+            <a:schemeClr val="accent3">
+              <a:shade val="50000"/>
+            </a:schemeClr>
+          </a:lnRef>
+          <a:fillRef idx="1">
+            <a:schemeClr val="accent3"/>
+          </a:fillRef>
+          <a:effectRef idx="0">
+            <a:schemeClr val="accent3"/>
+          </a:effectRef>
+          <a:fontRef idx="minor">
+            <a:schemeClr val="lt1"/>
+          </a:fontRef>
+        </p:style>
+        <p:txBody>
+          <a:bodyPr rtlCol="0" anchor="ctr"/>
+          <a:lstStyle/>
+          <a:p>
+            <a:pPr algn="ctr"/>
+            <a:endParaRPr lang="zh-CN" altLang="en-US"/>
+          </a:p>
+        </p:txBody>
+      </p:sp>
+      <p:sp>
+        <p:nvSpPr>
+          <p:cNvPr id="75" name="右箭头 74"/>
+          <p:cNvSpPr/>
+          <p:nvPr/>
+        </p:nvSpPr>
+        <p:spPr>
+          <a:xfrm>
+            <a:off x="71105" y="1638568"/>
+            <a:ext cx="714352" cy="170514"/>
+          </a:xfrm>
+          <a:prstGeom prst="rightArrow">
+            <a:avLst/>
+          </a:prstGeom>
+        </p:spPr>
+        <p:style>
+          <a:lnRef idx="2">
+            <a:schemeClr val="accent5">
+              <a:shade val="50000"/>
+            </a:schemeClr>
+          </a:lnRef>
+          <a:fillRef idx="1">
+            <a:schemeClr val="accent5"/>
+          </a:fillRef>
+          <a:effectRef idx="0">
+            <a:schemeClr val="accent5"/>
+          </a:effectRef>
+          <a:fontRef idx="minor">
+            <a:schemeClr val="lt1"/>
+          </a:fontRef>
+        </p:style>
+        <p:txBody>
+          <a:bodyPr rtlCol="0" anchor="ctr"/>
+          <a:lstStyle/>
+          <a:p>
+            <a:pPr algn="ctr"/>
+            <a:endParaRPr lang="zh-CN" altLang="en-US"/>
+          </a:p>
+        </p:txBody>
+      </p:sp>
+      <p:sp>
+        <p:nvSpPr>
+          <p:cNvPr id="78" name="矩形 77"/>
+          <p:cNvSpPr/>
+          <p:nvPr/>
+        </p:nvSpPr>
+        <p:spPr>
+          <a:xfrm>
+            <a:off x="9717333" y="898076"/>
+            <a:ext cx="2046514" cy="375558"/>
+          </a:xfrm>
+          <a:prstGeom prst="rect">
+            <a:avLst/>
+          </a:prstGeom>
+        </p:spPr>
+        <p:style>
+          <a:lnRef idx="2">
+            <a:schemeClr val="accent4">
+              <a:shade val="50000"/>
+            </a:schemeClr>
+          </a:lnRef>
+          <a:fillRef idx="1">
+            <a:schemeClr val="accent4"/>
+          </a:fillRef>
+          <a:effectRef idx="0">
+            <a:schemeClr val="accent4"/>
+          </a:effectRef>
+          <a:fontRef idx="minor">
+            <a:schemeClr val="lt1"/>
+          </a:fontRef>
+        </p:style>
+        <p:txBody>
+          <a:bodyPr rtlCol="0" anchor="ctr"/>
+          <a:lstStyle/>
+          <a:p>
+            <a:pPr algn="ctr"/>
+            <a:r>
+              <a:rPr lang="en-US" altLang="zh-CN" dirty="0" smtClean="0"/>
+              <a:t>Models</a:t>
+            </a:r>
+          </a:p>
+        </p:txBody>
+      </p:sp>
+      <p:sp>
+        <p:nvSpPr>
+          <p:cNvPr id="79" name="矩形 78"/>
+          <p:cNvSpPr/>
+          <p:nvPr/>
+        </p:nvSpPr>
+        <p:spPr>
+          <a:xfrm>
+            <a:off x="9717333" y="1499257"/>
+            <a:ext cx="2046514" cy="375558"/>
+          </a:xfrm>
+          <a:prstGeom prst="rect">
+            <a:avLst/>
+          </a:prstGeom>
+        </p:spPr>
+        <p:style>
+          <a:lnRef idx="2">
+            <a:schemeClr val="accent4">
+              <a:shade val="50000"/>
+            </a:schemeClr>
+          </a:lnRef>
+          <a:fillRef idx="1">
+            <a:schemeClr val="accent4"/>
+          </a:fillRef>
+          <a:effectRef idx="0">
+            <a:schemeClr val="accent4"/>
+          </a:effectRef>
+          <a:fontRef idx="minor">
+            <a:schemeClr val="lt1"/>
+          </a:fontRef>
+        </p:style>
+        <p:txBody>
+          <a:bodyPr rtlCol="0" anchor="ctr"/>
+          <a:lstStyle/>
+          <a:p>
+            <a:pPr algn="ctr"/>
+            <a:r>
+              <a:rPr lang="en-US" altLang="zh-CN" dirty="0" smtClean="0"/>
+              <a:t>Decks</a:t>
+            </a:r>
+          </a:p>
+        </p:txBody>
+      </p:sp>
+      <p:sp>
+        <p:nvSpPr>
+          <p:cNvPr id="82" name="右箭头 81"/>
+          <p:cNvSpPr/>
+          <p:nvPr/>
+        </p:nvSpPr>
+        <p:spPr>
+          <a:xfrm rot="10800000">
+            <a:off x="8407399" y="2294308"/>
+            <a:ext cx="1259661" cy="101629"/>
+          </a:xfrm>
+          <a:prstGeom prst="rightArrow">
+            <a:avLst/>
+          </a:prstGeom>
+        </p:spPr>
+        <p:style>
+          <a:lnRef idx="2">
+            <a:schemeClr val="accent2">
+              <a:shade val="50000"/>
+            </a:schemeClr>
+          </a:lnRef>
+          <a:fillRef idx="1">
+            <a:schemeClr val="accent2"/>
+          </a:fillRef>
+          <a:effectRef idx="0">
+            <a:schemeClr val="accent2"/>
+          </a:effectRef>
+          <a:fontRef idx="minor">
+            <a:schemeClr val="lt1"/>
+          </a:fontRef>
+        </p:style>
+        <p:txBody>
+          <a:bodyPr rtlCol="0" anchor="ctr"/>
+          <a:lstStyle/>
+          <a:p>
+            <a:pPr algn="ctr"/>
+            <a:endParaRPr lang="zh-CN" altLang="en-US"/>
+          </a:p>
+        </p:txBody>
+      </p:sp>
+      <p:sp>
+        <p:nvSpPr>
+          <p:cNvPr id="83" name="右箭头 82"/>
+          <p:cNvSpPr/>
+          <p:nvPr/>
+        </p:nvSpPr>
+        <p:spPr>
+          <a:xfrm rot="10800000">
+            <a:off x="9475942" y="2819295"/>
+            <a:ext cx="191118" cy="183301"/>
+          </a:xfrm>
+          <a:prstGeom prst="rightArrow">
+            <a:avLst/>
+          </a:prstGeom>
+        </p:spPr>
+        <p:style>
+          <a:lnRef idx="2">
+            <a:schemeClr val="accent1">
+              <a:shade val="50000"/>
+            </a:schemeClr>
+          </a:lnRef>
+          <a:fillRef idx="1">
+            <a:schemeClr val="accent1"/>
+          </a:fillRef>
+          <a:effectRef idx="0">
+            <a:schemeClr val="accent1"/>
+          </a:effectRef>
+          <a:fontRef idx="minor">
+            <a:schemeClr val="lt1"/>
+          </a:fontRef>
+        </p:style>
+        <p:txBody>
+          <a:bodyPr rtlCol="0" anchor="ctr"/>
+          <a:lstStyle/>
+          <a:p>
+            <a:pPr algn="ctr"/>
+            <a:endParaRPr lang="zh-CN" altLang="en-US"/>
+          </a:p>
+        </p:txBody>
+      </p:sp>
+      <p:sp>
+        <p:nvSpPr>
+          <p:cNvPr id="85" name="矩形 84"/>
+          <p:cNvSpPr/>
+          <p:nvPr/>
+        </p:nvSpPr>
+        <p:spPr>
+          <a:xfrm>
+            <a:off x="8474049" y="2635549"/>
+            <a:ext cx="971426" cy="869186"/>
+          </a:xfrm>
+          <a:prstGeom prst="rect">
+            <a:avLst/>
+          </a:prstGeom>
+          <a:ln>
+            <a:prstDash val="dash"/>
+          </a:ln>
+        </p:spPr>
+        <p:style>
+          <a:lnRef idx="2">
+            <a:schemeClr val="accent1">
+              <a:shade val="50000"/>
+            </a:schemeClr>
+          </a:lnRef>
+          <a:fillRef idx="1">
+            <a:schemeClr val="accent1"/>
+          </a:fillRef>
+          <a:effectRef idx="0">
+            <a:schemeClr val="accent1"/>
+          </a:effectRef>
+          <a:fontRef idx="minor">
+            <a:schemeClr val="lt1"/>
+          </a:fontRef>
+        </p:style>
+        <p:txBody>
+          <a:bodyPr rtlCol="0" anchor="ctr"/>
+          <a:lstStyle/>
+          <a:p>
+            <a:r>
+              <a:rPr lang="en-US" altLang="zh-CN" sz="1400" dirty="0" smtClean="0"/>
+              <a:t>Model</a:t>
+            </a:r>
+          </a:p>
+          <a:p>
+            <a:r>
+              <a:rPr lang="en-US" altLang="zh-CN" sz="1400" dirty="0" smtClean="0"/>
+              <a:t>_decks</a:t>
+            </a:r>
+          </a:p>
+          <a:p>
+            <a:r>
+              <a:rPr lang="en-US" altLang="zh-CN" sz="1400" dirty="0" smtClean="0"/>
+              <a:t>.</a:t>
+            </a:r>
+            <a:r>
+              <a:rPr lang="en-US" altLang="zh-CN" sz="1400" dirty="0" err="1" smtClean="0"/>
+              <a:t>model_id</a:t>
+            </a:r>
+            <a:endParaRPr lang="en-US" altLang="zh-CN" sz="1400" dirty="0" smtClean="0"/>
+          </a:p>
+          <a:p>
+            <a:r>
+              <a:rPr lang="en-US" altLang="zh-CN" sz="1400" dirty="0" smtClean="0"/>
+              <a:t>.</a:t>
+            </a:r>
+            <a:r>
+              <a:rPr lang="en-US" altLang="zh-CN" sz="1400" dirty="0" err="1" smtClean="0"/>
+              <a:t>deck_id</a:t>
+            </a:r>
+            <a:endParaRPr lang="zh-CN" altLang="en-US" sz="1400" dirty="0"/>
+          </a:p>
+        </p:txBody>
+      </p:sp>
+      <p:sp>
+        <p:nvSpPr>
+          <p:cNvPr id="86" name="矩形 85"/>
+          <p:cNvSpPr/>
+          <p:nvPr/>
+        </p:nvSpPr>
+        <p:spPr>
+          <a:xfrm>
+            <a:off x="9717333" y="2701620"/>
+            <a:ext cx="2046514" cy="375558"/>
+          </a:xfrm>
+          <a:prstGeom prst="rect">
+            <a:avLst/>
+          </a:prstGeom>
+        </p:spPr>
+        <p:style>
+          <a:lnRef idx="2">
+            <a:schemeClr val="accent4">
+              <a:shade val="50000"/>
+            </a:schemeClr>
+          </a:lnRef>
+          <a:fillRef idx="1">
+            <a:schemeClr val="accent4"/>
+          </a:fillRef>
+          <a:effectRef idx="0">
+            <a:schemeClr val="accent4"/>
+          </a:effectRef>
+          <a:fontRef idx="minor">
+            <a:schemeClr val="lt1"/>
+          </a:fontRef>
+        </p:style>
+        <p:txBody>
+          <a:bodyPr rtlCol="0" anchor="ctr"/>
+          <a:lstStyle/>
+          <a:p>
+            <a:pPr algn="ctr"/>
+            <a:r>
+              <a:rPr lang="en-US" altLang="zh-CN" dirty="0" smtClean="0"/>
+              <a:t>Cards</a:t>
+            </a:r>
+          </a:p>
+        </p:txBody>
+      </p:sp>
+      <p:sp>
+        <p:nvSpPr>
+          <p:cNvPr id="87" name="矩形 86"/>
+          <p:cNvSpPr/>
+          <p:nvPr/>
+        </p:nvSpPr>
+        <p:spPr>
+          <a:xfrm>
+            <a:off x="9717333" y="2100438"/>
+            <a:ext cx="2046514" cy="375558"/>
+          </a:xfrm>
+          <a:prstGeom prst="rect">
+            <a:avLst/>
+          </a:prstGeom>
+        </p:spPr>
+        <p:style>
+          <a:lnRef idx="2">
+            <a:schemeClr val="accent4">
+              <a:shade val="50000"/>
+            </a:schemeClr>
+          </a:lnRef>
+          <a:fillRef idx="1">
+            <a:schemeClr val="accent4"/>
+          </a:fillRef>
+          <a:effectRef idx="0">
+            <a:schemeClr val="accent4"/>
+          </a:effectRef>
+          <a:fontRef idx="minor">
+            <a:schemeClr val="lt1"/>
+          </a:fontRef>
+        </p:style>
+        <p:txBody>
+          <a:bodyPr rtlCol="0" anchor="ctr"/>
+          <a:lstStyle/>
+          <a:p>
+            <a:pPr algn="ctr"/>
+            <a:r>
+              <a:rPr lang="en-US" altLang="zh-CN" dirty="0" smtClean="0"/>
+              <a:t>Notes ..tags</a:t>
+            </a:r>
+          </a:p>
+        </p:txBody>
+      </p:sp>
+      <p:sp>
+        <p:nvSpPr>
+          <p:cNvPr id="88" name="右箭头 87"/>
+          <p:cNvSpPr/>
+          <p:nvPr/>
+        </p:nvSpPr>
+        <p:spPr>
+          <a:xfrm rot="8210705">
+            <a:off x="6547692" y="3039752"/>
+            <a:ext cx="2150602" cy="108906"/>
+          </a:xfrm>
+          <a:prstGeom prst="rightArrow">
+            <a:avLst/>
+          </a:prstGeom>
+        </p:spPr>
+        <p:style>
+          <a:lnRef idx="2">
+            <a:schemeClr val="accent2">
+              <a:shade val="50000"/>
+            </a:schemeClr>
+          </a:lnRef>
+          <a:fillRef idx="1">
+            <a:schemeClr val="accent2"/>
+          </a:fillRef>
+          <a:effectRef idx="0">
+            <a:schemeClr val="accent2"/>
+          </a:effectRef>
+          <a:fontRef idx="minor">
+            <a:schemeClr val="lt1"/>
+          </a:fontRef>
+        </p:style>
+        <p:txBody>
+          <a:bodyPr rtlCol="0" anchor="ctr"/>
+          <a:lstStyle/>
+          <a:p>
+            <a:pPr algn="ctr"/>
+            <a:endParaRPr lang="zh-CN" altLang="en-US"/>
+          </a:p>
+        </p:txBody>
+      </p:sp>
+      <p:sp>
+        <p:nvSpPr>
+          <p:cNvPr id="89" name="右箭头 88"/>
+          <p:cNvSpPr/>
+          <p:nvPr/>
+        </p:nvSpPr>
+        <p:spPr>
+          <a:xfrm rot="8707495">
+            <a:off x="6691729" y="3298532"/>
+            <a:ext cx="1948138" cy="132848"/>
+          </a:xfrm>
+          <a:prstGeom prst="rightArrow">
+            <a:avLst/>
+          </a:prstGeom>
+        </p:spPr>
+        <p:style>
+          <a:lnRef idx="2">
+            <a:schemeClr val="accent2">
+              <a:shade val="50000"/>
+            </a:schemeClr>
+          </a:lnRef>
+          <a:fillRef idx="1">
+            <a:schemeClr val="accent2"/>
+          </a:fillRef>
+          <a:effectRef idx="0">
+            <a:schemeClr val="accent2"/>
+          </a:effectRef>
+          <a:fontRef idx="minor">
+            <a:schemeClr val="lt1"/>
+          </a:fontRef>
+        </p:style>
+        <p:txBody>
+          <a:bodyPr rtlCol="0" anchor="ctr"/>
+          <a:lstStyle/>
+          <a:p>
+            <a:pPr algn="ctr"/>
+            <a:endParaRPr lang="zh-CN" altLang="en-US"/>
+          </a:p>
+        </p:txBody>
+      </p:sp>
+      <p:sp>
+        <p:nvSpPr>
+          <p:cNvPr id="94" name="左弧形箭头 93"/>
+          <p:cNvSpPr/>
+          <p:nvPr/>
+        </p:nvSpPr>
+        <p:spPr>
+          <a:xfrm rot="10800000" flipH="1">
+            <a:off x="7995077" y="1792063"/>
+            <a:ext cx="453836" cy="1636936"/>
+          </a:xfrm>
+          <a:prstGeom prst="curvedRightArrow">
+            <a:avLst>
+              <a:gd name="adj1" fmla="val 25000"/>
+              <a:gd name="adj2" fmla="val 32663"/>
+              <a:gd name="adj3" fmla="val 25000"/>
+            </a:avLst>
+          </a:prstGeom>
+        </p:spPr>
+        <p:style>
+          <a:lnRef idx="2">
+            <a:schemeClr val="accent3">
+              <a:shade val="50000"/>
+            </a:schemeClr>
+          </a:lnRef>
+          <a:fillRef idx="1">
+            <a:schemeClr val="accent3"/>
+          </a:fillRef>
+          <a:effectRef idx="0">
+            <a:schemeClr val="accent3"/>
+          </a:effectRef>
+          <a:fontRef idx="minor">
+            <a:schemeClr val="lt1"/>
+          </a:fontRef>
+        </p:style>
+        <p:txBody>
+          <a:bodyPr rtlCol="0" anchor="ctr"/>
+          <a:lstStyle/>
+          <a:p>
+            <a:pPr algn="ctr"/>
+            <a:endParaRPr lang="zh-CN" altLang="en-US">
+              <a:solidFill>
+                <a:schemeClr val="tx1"/>
+              </a:solidFill>
+            </a:endParaRPr>
+          </a:p>
+        </p:txBody>
+      </p:sp>
+      <p:sp>
+        <p:nvSpPr>
+          <p:cNvPr id="95" name="右箭头 94"/>
+          <p:cNvSpPr/>
+          <p:nvPr/>
+        </p:nvSpPr>
+        <p:spPr>
+          <a:xfrm rot="10800000" flipH="1">
+            <a:off x="8511954" y="1774395"/>
+            <a:ext cx="1155106" cy="134641"/>
+          </a:xfrm>
+          <a:prstGeom prst="rightArrow">
+            <a:avLst/>
+          </a:prstGeom>
+        </p:spPr>
+        <p:style>
+          <a:lnRef idx="2">
+            <a:schemeClr val="accent3">
+              <a:shade val="50000"/>
+            </a:schemeClr>
+          </a:lnRef>
+          <a:fillRef idx="1">
+            <a:schemeClr val="accent3"/>
+          </a:fillRef>
+          <a:effectRef idx="0">
+            <a:schemeClr val="accent3"/>
+          </a:effectRef>
+          <a:fontRef idx="minor">
+            <a:schemeClr val="lt1"/>
+          </a:fontRef>
+        </p:style>
+        <p:txBody>
+          <a:bodyPr rtlCol="0" anchor="ctr"/>
+          <a:lstStyle/>
+          <a:p>
+            <a:pPr algn="ctr"/>
+            <a:endParaRPr lang="zh-CN" altLang="en-US"/>
+          </a:p>
+        </p:txBody>
+      </p:sp>
+      <p:sp>
+        <p:nvSpPr>
+          <p:cNvPr id="96" name="右箭头 95"/>
+          <p:cNvSpPr/>
+          <p:nvPr/>
+        </p:nvSpPr>
+        <p:spPr>
+          <a:xfrm rot="10800000">
+            <a:off x="8191310" y="1587752"/>
+            <a:ext cx="1475749" cy="105559"/>
+          </a:xfrm>
+          <a:prstGeom prst="rightArrow">
+            <a:avLst/>
+          </a:prstGeom>
+        </p:spPr>
+        <p:style>
+          <a:lnRef idx="2">
+            <a:schemeClr val="accent3">
+              <a:shade val="50000"/>
+            </a:schemeClr>
+          </a:lnRef>
+          <a:fillRef idx="1">
+            <a:schemeClr val="accent3"/>
+          </a:fillRef>
+          <a:effectRef idx="0">
+            <a:schemeClr val="accent3"/>
+          </a:effectRef>
+          <a:fontRef idx="minor">
+            <a:schemeClr val="lt1"/>
+          </a:fontRef>
+        </p:style>
+        <p:txBody>
+          <a:bodyPr rtlCol="0" anchor="ctr"/>
+          <a:lstStyle/>
+          <a:p>
+            <a:pPr algn="ctr"/>
+            <a:endParaRPr lang="zh-CN" altLang="en-US"/>
+          </a:p>
+        </p:txBody>
+      </p:sp>
+      <p:sp>
+        <p:nvSpPr>
+          <p:cNvPr id="97" name="右箭头 96"/>
+          <p:cNvSpPr/>
+          <p:nvPr/>
+        </p:nvSpPr>
+        <p:spPr>
+          <a:xfrm rot="8267873">
+            <a:off x="6883282" y="2099289"/>
+            <a:ext cx="1479419" cy="166641"/>
+          </a:xfrm>
+          <a:prstGeom prst="rightArrow">
+            <a:avLst/>
+          </a:prstGeom>
+        </p:spPr>
+        <p:style>
+          <a:lnRef idx="2">
+            <a:schemeClr val="accent3">
+              <a:shade val="50000"/>
+            </a:schemeClr>
+          </a:lnRef>
+          <a:fillRef idx="1">
+            <a:schemeClr val="accent3"/>
+          </a:fillRef>
+          <a:effectRef idx="0">
+            <a:schemeClr val="accent3"/>
+          </a:effectRef>
+          <a:fontRef idx="minor">
+            <a:schemeClr val="lt1"/>
+          </a:fontRef>
+        </p:style>
+        <p:txBody>
+          <a:bodyPr rtlCol="0" anchor="ctr"/>
+          <a:lstStyle/>
+          <a:p>
+            <a:pPr algn="ctr"/>
+            <a:endParaRPr lang="zh-CN" altLang="en-US"/>
+          </a:p>
+        </p:txBody>
+      </p:sp>
+      <p:sp>
+        <p:nvSpPr>
+          <p:cNvPr id="98" name="右弧形箭头 97"/>
+          <p:cNvSpPr/>
+          <p:nvPr/>
+        </p:nvSpPr>
+        <p:spPr>
+          <a:xfrm>
+            <a:off x="7113810" y="2705576"/>
+            <a:ext cx="524108" cy="2371681"/>
+          </a:xfrm>
+          <a:prstGeom prst="curvedLeftArrow">
+            <a:avLst/>
+          </a:prstGeom>
+        </p:spPr>
+        <p:style>
+          <a:lnRef idx="2">
+            <a:schemeClr val="accent3">
+              <a:shade val="50000"/>
+            </a:schemeClr>
+          </a:lnRef>
+          <a:fillRef idx="1">
+            <a:schemeClr val="accent3"/>
+          </a:fillRef>
+          <a:effectRef idx="0">
+            <a:schemeClr val="accent3"/>
+          </a:effectRef>
+          <a:fontRef idx="minor">
+            <a:schemeClr val="lt1"/>
+          </a:fontRef>
+        </p:style>
+        <p:txBody>
+          <a:bodyPr rtlCol="0" anchor="ctr"/>
+          <a:lstStyle/>
+          <a:p>
+            <a:pPr algn="ctr"/>
+            <a:endParaRPr lang="zh-CN" altLang="en-US">
+              <a:solidFill>
+                <a:schemeClr val="tx1"/>
+              </a:solidFill>
+            </a:endParaRPr>
+          </a:p>
+        </p:txBody>
+      </p:sp>
+      <p:sp>
+        <p:nvSpPr>
+          <p:cNvPr id="99" name="左弧形箭头 98"/>
+          <p:cNvSpPr/>
+          <p:nvPr/>
+        </p:nvSpPr>
+        <p:spPr>
+          <a:xfrm rot="10800000" flipH="1">
+            <a:off x="7993863" y="1106987"/>
+            <a:ext cx="453836" cy="2096808"/>
+          </a:xfrm>
+          <a:prstGeom prst="curvedRightArrow">
+            <a:avLst>
+              <a:gd name="adj1" fmla="val 25000"/>
+              <a:gd name="adj2" fmla="val 32663"/>
+              <a:gd name="adj3" fmla="val 25000"/>
+            </a:avLst>
+          </a:prstGeom>
+        </p:spPr>
+        <p:style>
+          <a:lnRef idx="2">
+            <a:schemeClr val="accent5">
+              <a:shade val="50000"/>
+            </a:schemeClr>
+          </a:lnRef>
+          <a:fillRef idx="1">
+            <a:schemeClr val="accent5"/>
+          </a:fillRef>
+          <a:effectRef idx="0">
+            <a:schemeClr val="accent5"/>
+          </a:effectRef>
+          <a:fontRef idx="minor">
+            <a:schemeClr val="lt1"/>
+          </a:fontRef>
+        </p:style>
+        <p:txBody>
+          <a:bodyPr rtlCol="0" anchor="ctr"/>
+          <a:lstStyle/>
+          <a:p>
+            <a:pPr algn="ctr"/>
+            <a:endParaRPr lang="zh-CN" altLang="en-US">
+              <a:solidFill>
+                <a:schemeClr val="tx1"/>
+              </a:solidFill>
+            </a:endParaRPr>
+          </a:p>
+        </p:txBody>
+      </p:sp>
+      <p:sp>
+        <p:nvSpPr>
+          <p:cNvPr id="100" name="右箭头 99"/>
+          <p:cNvSpPr/>
+          <p:nvPr/>
+        </p:nvSpPr>
+        <p:spPr>
+          <a:xfrm rot="10800000" flipH="1">
+            <a:off x="8485857" y="1112514"/>
+            <a:ext cx="1155106" cy="134641"/>
+          </a:xfrm>
+          <a:prstGeom prst="rightArrow">
+            <a:avLst/>
+          </a:prstGeom>
+        </p:spPr>
+        <p:style>
+          <a:lnRef idx="2">
+            <a:schemeClr val="accent5">
+              <a:shade val="50000"/>
+            </a:schemeClr>
+          </a:lnRef>
+          <a:fillRef idx="1">
+            <a:schemeClr val="accent5"/>
+          </a:fillRef>
+          <a:effectRef idx="0">
+            <a:schemeClr val="accent5"/>
+          </a:effectRef>
+          <a:fontRef idx="minor">
+            <a:schemeClr val="lt1"/>
+          </a:fontRef>
+        </p:style>
+        <p:txBody>
+          <a:bodyPr rtlCol="0" anchor="ctr"/>
+          <a:lstStyle/>
+          <a:p>
+            <a:pPr algn="ctr"/>
+            <a:endParaRPr lang="zh-CN" altLang="en-US"/>
+          </a:p>
+        </p:txBody>
+      </p:sp>
+      <p:sp>
+        <p:nvSpPr>
+          <p:cNvPr id="101" name="右箭头 100"/>
+          <p:cNvSpPr/>
+          <p:nvPr/>
+        </p:nvSpPr>
+        <p:spPr>
+          <a:xfrm rot="10800000">
+            <a:off x="7182438" y="925870"/>
+            <a:ext cx="2458523" cy="140390"/>
+          </a:xfrm>
+          <a:prstGeom prst="rightArrow">
+            <a:avLst/>
+          </a:prstGeom>
+        </p:spPr>
+        <p:style>
+          <a:lnRef idx="2">
+            <a:schemeClr val="accent5">
+              <a:shade val="50000"/>
+            </a:schemeClr>
+          </a:lnRef>
+          <a:fillRef idx="1">
+            <a:schemeClr val="accent5"/>
+          </a:fillRef>
+          <a:effectRef idx="0">
+            <a:schemeClr val="accent5"/>
+          </a:effectRef>
+          <a:fontRef idx="minor">
+            <a:schemeClr val="lt1"/>
+          </a:fontRef>
+        </p:style>
+        <p:txBody>
+          <a:bodyPr rtlCol="0" anchor="ctr"/>
+          <a:lstStyle/>
+          <a:p>
+            <a:pPr algn="ctr"/>
+            <a:endParaRPr lang="zh-CN" altLang="en-US"/>
+          </a:p>
+        </p:txBody>
+      </p:sp>
+      <p:sp>
+        <p:nvSpPr>
+          <p:cNvPr id="103" name="右弧形箭头 102"/>
+          <p:cNvSpPr/>
+          <p:nvPr/>
+        </p:nvSpPr>
+        <p:spPr>
+          <a:xfrm>
+            <a:off x="7167445" y="1106987"/>
+            <a:ext cx="524108" cy="3454083"/>
+          </a:xfrm>
+          <a:prstGeom prst="curvedLeftArrow">
+            <a:avLst/>
+          </a:prstGeom>
+        </p:spPr>
+        <p:style>
+          <a:lnRef idx="2">
+            <a:schemeClr val="accent5">
+              <a:shade val="50000"/>
+            </a:schemeClr>
+          </a:lnRef>
+          <a:fillRef idx="1">
+            <a:schemeClr val="accent5"/>
+          </a:fillRef>
+          <a:effectRef idx="0">
+            <a:schemeClr val="accent5"/>
+          </a:effectRef>
+          <a:fontRef idx="minor">
+            <a:schemeClr val="lt1"/>
+          </a:fontRef>
+        </p:style>
+        <p:txBody>
+          <a:bodyPr rtlCol="0" anchor="ctr"/>
+          <a:lstStyle/>
+          <a:p>
+            <a:pPr algn="ctr"/>
+            <a:endParaRPr lang="zh-CN" altLang="en-US">
+              <a:solidFill>
+                <a:schemeClr val="tx1"/>
+              </a:solidFill>
+            </a:endParaRPr>
+          </a:p>
+        </p:txBody>
+      </p:sp>
+    </p:spTree>
+    <p:extLst>
+      <p:ext uri="{BB962C8B-B14F-4D97-AF65-F5344CB8AC3E}">
+        <p14:creationId xmlns:p14="http://schemas.microsoft.com/office/powerpoint/2010/main" val="3073587105"/>
+      </p:ext>
+    </p:extLst>
+  </p:cSld>
+  <p:clrMapOvr>
+    <a:masterClrMapping/>
+  </p:clrMapOvr>
+</p:sld>
+</file>
+
 <file path=ppt/theme/theme1.xml><?xml version="1.0" encoding="utf-8"?>
 <a:theme xmlns:a="http://schemas.openxmlformats.org/drawingml/2006/main" name="Office 主题">
   <a:themeElements>

</xml_diff>